<commit_message>
February 2021 Update - Release Candidate
February release candidate - February 2021 update
</commit_message>
<xml_diff>
--- a/Microsoft 365 Enterprise License Map.pptx
+++ b/Microsoft 365 Enterprise License Map.pptx
@@ -1,11 +1,11 @@
 
 <file path=ppt/presentation.xml><?xml version="1.0" encoding="utf-8"?>
-<p:presentation xmlns:a="http://schemas.openxmlformats.org/drawingml/2006/main" xmlns:r="http://schemas.openxmlformats.org/officeDocument/2006/relationships" xmlns:p="http://schemas.openxmlformats.org/presentationml/2006/main" saveSubsetFonts="1">
+<p:presentation xmlns:a="http://schemas.openxmlformats.org/drawingml/2006/main" xmlns:r="http://schemas.openxmlformats.org/officeDocument/2006/relationships" xmlns:p="http://schemas.openxmlformats.org/presentationml/2006/main" removePersonalInfoOnSave="1" saveSubsetFonts="1">
   <p:sldMasterIdLst>
     <p:sldMasterId id="2147483648" r:id="rId1"/>
   </p:sldMasterIdLst>
   <p:notesMasterIdLst>
-    <p:notesMasterId r:id="rId9"/>
+    <p:notesMasterId r:id="rId10"/>
   </p:notesMasterIdLst>
   <p:sldIdLst>
     <p:sldId id="273" r:id="rId2"/>
@@ -13,8 +13,9 @@
     <p:sldId id="266" r:id="rId4"/>
     <p:sldId id="271" r:id="rId5"/>
     <p:sldId id="272" r:id="rId6"/>
-    <p:sldId id="267" r:id="rId7"/>
-    <p:sldId id="277" r:id="rId8"/>
+    <p:sldId id="278" r:id="rId7"/>
+    <p:sldId id="267" r:id="rId8"/>
+    <p:sldId id="277" r:id="rId9"/>
   </p:sldIdLst>
   <p:sldSz cx="12192000" cy="6858000"/>
   <p:notesSz cx="6858000" cy="9144000"/>
@@ -123,6 +124,7 @@
             <p14:sldId id="266"/>
             <p14:sldId id="271"/>
             <p14:sldId id="272"/>
+            <p14:sldId id="278"/>
             <p14:sldId id="267"/>
             <p14:sldId id="277"/>
           </p14:sldIdLst>
@@ -139,223 +141,9 @@
 <file path=ppt/revisionInfo.xml><?xml version="1.0" encoding="utf-8"?>
 <p1510:revInfo xmlns:a="http://schemas.openxmlformats.org/drawingml/2006/main" xmlns:r="http://schemas.openxmlformats.org/officeDocument/2006/relationships" xmlns:p1510="http://schemas.microsoft.com/office/powerpoint/2015/10/main">
   <p1510:revLst>
-    <p1510:client id="{ED25B4B7-1C53-4AC8-A0AD-673D8F6F5461}" v="10" dt="2020-12-06T09:40:42.994"/>
+    <p1510:client id="{511945EA-59AD-490D-A736-3EA0D68DB087}" v="24" dt="2021-02-08T13:36:24.395"/>
   </p1510:revLst>
 </p1510:revInfo>
-</file>
-
-<file path=ppt/changesInfos/changesInfo1.xml><?xml version="1.0" encoding="utf-8"?>
-<pc:chgInfo xmlns:a="http://schemas.openxmlformats.org/drawingml/2006/main" xmlns:r="http://schemas.openxmlformats.org/officeDocument/2006/relationships" xmlns:ac="http://schemas.microsoft.com/office/drawing/2013/main/command" xmlns:pc="http://schemas.microsoft.com/office/powerpoint/2013/main/command">
-  <pc:docChgLst>
-    <pc:chgData name="Aaron Dinnage" userId="8cb68394-1244-40dc-97d1-6a2511d83b6b" providerId="ADAL" clId="{ED25B4B7-1C53-4AC8-A0AD-673D8F6F5461}"/>
-    <pc:docChg chg="custSel addSld delSld modSld sldOrd modSection">
-      <pc:chgData name="Aaron Dinnage" userId="8cb68394-1244-40dc-97d1-6a2511d83b6b" providerId="ADAL" clId="{ED25B4B7-1C53-4AC8-A0AD-673D8F6F5461}" dt="2020-12-06T09:41:08.295" v="122" actId="20577"/>
-      <pc:docMkLst>
-        <pc:docMk/>
-      </pc:docMkLst>
-      <pc:sldChg chg="modSp del mod">
-        <pc:chgData name="Aaron Dinnage" userId="8cb68394-1244-40dc-97d1-6a2511d83b6b" providerId="ADAL" clId="{ED25B4B7-1C53-4AC8-A0AD-673D8F6F5461}" dt="2020-12-06T09:36:18.550" v="30" actId="47"/>
-        <pc:sldMkLst>
-          <pc:docMk/>
-          <pc:sldMk cId="2896464772" sldId="256"/>
-        </pc:sldMkLst>
-        <pc:spChg chg="mod">
-          <ac:chgData name="Aaron Dinnage" userId="8cb68394-1244-40dc-97d1-6a2511d83b6b" providerId="ADAL" clId="{ED25B4B7-1C53-4AC8-A0AD-673D8F6F5461}" dt="2020-12-06T09:35:27.197" v="7" actId="20577"/>
-          <ac:spMkLst>
-            <pc:docMk/>
-            <pc:sldMk cId="2896464772" sldId="256"/>
-            <ac:spMk id="3" creationId="{70473A01-3EA4-4990-8E8B-F325477388E6}"/>
-          </ac:spMkLst>
-        </pc:spChg>
-      </pc:sldChg>
-      <pc:sldChg chg="addSp delSp modSp mod">
-        <pc:chgData name="Aaron Dinnage" userId="8cb68394-1244-40dc-97d1-6a2511d83b6b" providerId="ADAL" clId="{ED25B4B7-1C53-4AC8-A0AD-673D8F6F5461}" dt="2020-12-06T09:39:19.001" v="86"/>
-        <pc:sldMkLst>
-          <pc:docMk/>
-          <pc:sldMk cId="3387588480" sldId="265"/>
-        </pc:sldMkLst>
-        <pc:picChg chg="add del mod modCrop">
-          <ac:chgData name="Aaron Dinnage" userId="8cb68394-1244-40dc-97d1-6a2511d83b6b" providerId="ADAL" clId="{ED25B4B7-1C53-4AC8-A0AD-673D8F6F5461}" dt="2020-12-06T09:38:51.908" v="84" actId="478"/>
-          <ac:picMkLst>
-            <pc:docMk/>
-            <pc:sldMk cId="3387588480" sldId="265"/>
-            <ac:picMk id="4" creationId="{8C62164E-2DD5-4B46-BFE9-F4155FFD1A75}"/>
-          </ac:picMkLst>
-        </pc:picChg>
-        <pc:picChg chg="del">
-          <ac:chgData name="Aaron Dinnage" userId="8cb68394-1244-40dc-97d1-6a2511d83b6b" providerId="ADAL" clId="{ED25B4B7-1C53-4AC8-A0AD-673D8F6F5461}" dt="2020-12-06T09:37:20.339" v="43" actId="478"/>
-          <ac:picMkLst>
-            <pc:docMk/>
-            <pc:sldMk cId="3387588480" sldId="265"/>
-            <ac:picMk id="5" creationId="{026AF917-DF41-49A8-AF0F-5F064B455232}"/>
-          </ac:picMkLst>
-        </pc:picChg>
-        <pc:picChg chg="add">
-          <ac:chgData name="Aaron Dinnage" userId="8cb68394-1244-40dc-97d1-6a2511d83b6b" providerId="ADAL" clId="{ED25B4B7-1C53-4AC8-A0AD-673D8F6F5461}" dt="2020-12-06T09:39:19.001" v="86"/>
-          <ac:picMkLst>
-            <pc:docMk/>
-            <pc:sldMk cId="3387588480" sldId="265"/>
-            <ac:picMk id="6" creationId="{689B9B48-51C7-45C5-A4E1-408F3297D630}"/>
-          </ac:picMkLst>
-        </pc:picChg>
-      </pc:sldChg>
-      <pc:sldChg chg="addSp delSp modSp mod">
-        <pc:chgData name="Aaron Dinnage" userId="8cb68394-1244-40dc-97d1-6a2511d83b6b" providerId="ADAL" clId="{ED25B4B7-1C53-4AC8-A0AD-673D8F6F5461}" dt="2020-12-06T09:39:58.296" v="97" actId="1076"/>
-        <pc:sldMkLst>
-          <pc:docMk/>
-          <pc:sldMk cId="2041766854" sldId="266"/>
-        </pc:sldMkLst>
-        <pc:spChg chg="add mod">
-          <ac:chgData name="Aaron Dinnage" userId="8cb68394-1244-40dc-97d1-6a2511d83b6b" providerId="ADAL" clId="{ED25B4B7-1C53-4AC8-A0AD-673D8F6F5461}" dt="2020-12-06T09:39:52.986" v="90"/>
-          <ac:spMkLst>
-            <pc:docMk/>
-            <pc:sldMk cId="2041766854" sldId="266"/>
-            <ac:spMk id="7" creationId="{69C4F443-C1DA-435C-BCC1-181815DDC7DB}"/>
-          </ac:spMkLst>
-        </pc:spChg>
-        <pc:spChg chg="del">
-          <ac:chgData name="Aaron Dinnage" userId="8cb68394-1244-40dc-97d1-6a2511d83b6b" providerId="ADAL" clId="{ED25B4B7-1C53-4AC8-A0AD-673D8F6F5461}" dt="2020-12-06T09:39:48.074" v="89" actId="478"/>
-          <ac:spMkLst>
-            <pc:docMk/>
-            <pc:sldMk cId="2041766854" sldId="266"/>
-            <ac:spMk id="39" creationId="{9243AAE3-2CDF-4AD0-B562-EFC601549DCA}"/>
-          </ac:spMkLst>
-        </pc:spChg>
-        <pc:picChg chg="del">
-          <ac:chgData name="Aaron Dinnage" userId="8cb68394-1244-40dc-97d1-6a2511d83b6b" providerId="ADAL" clId="{ED25B4B7-1C53-4AC8-A0AD-673D8F6F5461}" dt="2020-12-06T09:38:01.809" v="77" actId="478"/>
-          <ac:picMkLst>
-            <pc:docMk/>
-            <pc:sldMk cId="2041766854" sldId="266"/>
-            <ac:picMk id="3" creationId="{95700EEB-8DEE-4140-91A3-D0F1035B4F7B}"/>
-          </ac:picMkLst>
-        </pc:picChg>
-        <pc:picChg chg="add del mod modCrop">
-          <ac:chgData name="Aaron Dinnage" userId="8cb68394-1244-40dc-97d1-6a2511d83b6b" providerId="ADAL" clId="{ED25B4B7-1C53-4AC8-A0AD-673D8F6F5461}" dt="2020-12-06T09:38:53.360" v="85" actId="478"/>
-          <ac:picMkLst>
-            <pc:docMk/>
-            <pc:sldMk cId="2041766854" sldId="266"/>
-            <ac:picMk id="4" creationId="{48C0A479-749C-42F3-91A6-D04AE9FE9CD6}"/>
-          </ac:picMkLst>
-        </pc:picChg>
-        <pc:picChg chg="add mod ord">
-          <ac:chgData name="Aaron Dinnage" userId="8cb68394-1244-40dc-97d1-6a2511d83b6b" providerId="ADAL" clId="{ED25B4B7-1C53-4AC8-A0AD-673D8F6F5461}" dt="2020-12-06T09:39:58.296" v="97" actId="1076"/>
-          <ac:picMkLst>
-            <pc:docMk/>
-            <pc:sldMk cId="2041766854" sldId="266"/>
-            <ac:picMk id="5" creationId="{1A3D8FDE-254B-47FD-B61D-C0E676906DD8}"/>
-          </ac:picMkLst>
-        </pc:picChg>
-      </pc:sldChg>
-      <pc:sldChg chg="addSp delSp modSp mod">
-        <pc:chgData name="Aaron Dinnage" userId="8cb68394-1244-40dc-97d1-6a2511d83b6b" providerId="ADAL" clId="{ED25B4B7-1C53-4AC8-A0AD-673D8F6F5461}" dt="2020-12-06T09:41:08.295" v="122" actId="20577"/>
-        <pc:sldMkLst>
-          <pc:docMk/>
-          <pc:sldMk cId="2245115415" sldId="267"/>
-        </pc:sldMkLst>
-        <pc:spChg chg="mod">
-          <ac:chgData name="Aaron Dinnage" userId="8cb68394-1244-40dc-97d1-6a2511d83b6b" providerId="ADAL" clId="{ED25B4B7-1C53-4AC8-A0AD-673D8F6F5461}" dt="2020-12-06T09:41:08.295" v="122" actId="20577"/>
-          <ac:spMkLst>
-            <pc:docMk/>
-            <pc:sldMk cId="2245115415" sldId="267"/>
-            <ac:spMk id="2" creationId="{67D97FFD-C060-4DB0-B692-9BB5BF1C264A}"/>
-          </ac:spMkLst>
-        </pc:spChg>
-        <pc:picChg chg="add mod">
-          <ac:chgData name="Aaron Dinnage" userId="8cb68394-1244-40dc-97d1-6a2511d83b6b" providerId="ADAL" clId="{ED25B4B7-1C53-4AC8-A0AD-673D8F6F5461}" dt="2020-12-06T09:40:53.218" v="106" actId="1076"/>
-          <ac:picMkLst>
-            <pc:docMk/>
-            <pc:sldMk cId="2245115415" sldId="267"/>
-            <ac:picMk id="4" creationId="{1DEE5889-E7AA-49A3-AFFC-17CFB52E0803}"/>
-          </ac:picMkLst>
-        </pc:picChg>
-        <pc:picChg chg="del">
-          <ac:chgData name="Aaron Dinnage" userId="8cb68394-1244-40dc-97d1-6a2511d83b6b" providerId="ADAL" clId="{ED25B4B7-1C53-4AC8-A0AD-673D8F6F5461}" dt="2020-12-06T09:40:33.434" v="102" actId="478"/>
-          <ac:picMkLst>
-            <pc:docMk/>
-            <pc:sldMk cId="2245115415" sldId="267"/>
-            <ac:picMk id="6" creationId="{569DA7EA-B310-4248-BB58-BA1F748D1A16}"/>
-          </ac:picMkLst>
-        </pc:picChg>
-      </pc:sldChg>
-      <pc:sldChg chg="addSp delSp mod">
-        <pc:chgData name="Aaron Dinnage" userId="8cb68394-1244-40dc-97d1-6a2511d83b6b" providerId="ADAL" clId="{ED25B4B7-1C53-4AC8-A0AD-673D8F6F5461}" dt="2020-12-06T09:40:14.938" v="99"/>
-        <pc:sldMkLst>
-          <pc:docMk/>
-          <pc:sldMk cId="1483979729" sldId="271"/>
-        </pc:sldMkLst>
-        <pc:picChg chg="add">
-          <ac:chgData name="Aaron Dinnage" userId="8cb68394-1244-40dc-97d1-6a2511d83b6b" providerId="ADAL" clId="{ED25B4B7-1C53-4AC8-A0AD-673D8F6F5461}" dt="2020-12-06T09:40:14.938" v="99"/>
-          <ac:picMkLst>
-            <pc:docMk/>
-            <pc:sldMk cId="1483979729" sldId="271"/>
-            <ac:picMk id="3" creationId="{B63577D0-5E42-42DC-811B-6A69F89FE748}"/>
-          </ac:picMkLst>
-        </pc:picChg>
-        <pc:picChg chg="del">
-          <ac:chgData name="Aaron Dinnage" userId="8cb68394-1244-40dc-97d1-6a2511d83b6b" providerId="ADAL" clId="{ED25B4B7-1C53-4AC8-A0AD-673D8F6F5461}" dt="2020-12-06T09:40:06.508" v="98" actId="478"/>
-          <ac:picMkLst>
-            <pc:docMk/>
-            <pc:sldMk cId="1483979729" sldId="271"/>
-            <ac:picMk id="7" creationId="{91AA2AD7-ACCA-4557-9C42-2629CA29CAF4}"/>
-          </ac:picMkLst>
-        </pc:picChg>
-      </pc:sldChg>
-      <pc:sldChg chg="addSp delSp mod">
-        <pc:chgData name="Aaron Dinnage" userId="8cb68394-1244-40dc-97d1-6a2511d83b6b" providerId="ADAL" clId="{ED25B4B7-1C53-4AC8-A0AD-673D8F6F5461}" dt="2020-12-06T09:40:27.481" v="101"/>
-        <pc:sldMkLst>
-          <pc:docMk/>
-          <pc:sldMk cId="1861237408" sldId="272"/>
-        </pc:sldMkLst>
-        <pc:picChg chg="add">
-          <ac:chgData name="Aaron Dinnage" userId="8cb68394-1244-40dc-97d1-6a2511d83b6b" providerId="ADAL" clId="{ED25B4B7-1C53-4AC8-A0AD-673D8F6F5461}" dt="2020-12-06T09:40:27.481" v="101"/>
-          <ac:picMkLst>
-            <pc:docMk/>
-            <pc:sldMk cId="1861237408" sldId="272"/>
-            <ac:picMk id="3" creationId="{7D628F2D-1F73-4E22-ADA1-03984CC11C94}"/>
-          </ac:picMkLst>
-        </pc:picChg>
-        <pc:picChg chg="del">
-          <ac:chgData name="Aaron Dinnage" userId="8cb68394-1244-40dc-97d1-6a2511d83b6b" providerId="ADAL" clId="{ED25B4B7-1C53-4AC8-A0AD-673D8F6F5461}" dt="2020-12-06T09:40:19.465" v="100" actId="478"/>
-          <ac:picMkLst>
-            <pc:docMk/>
-            <pc:sldMk cId="1861237408" sldId="272"/>
-            <ac:picMk id="4" creationId="{A818503F-893C-4B30-900D-EA31DC9B247B}"/>
-          </ac:picMkLst>
-        </pc:picChg>
-      </pc:sldChg>
-      <pc:sldChg chg="modSp add mod">
-        <pc:chgData name="Aaron Dinnage" userId="8cb68394-1244-40dc-97d1-6a2511d83b6b" providerId="ADAL" clId="{ED25B4B7-1C53-4AC8-A0AD-673D8F6F5461}" dt="2020-12-06T09:36:31.038" v="39" actId="20577"/>
-        <pc:sldMkLst>
-          <pc:docMk/>
-          <pc:sldMk cId="851380115" sldId="273"/>
-        </pc:sldMkLst>
-        <pc:spChg chg="mod">
-          <ac:chgData name="Aaron Dinnage" userId="8cb68394-1244-40dc-97d1-6a2511d83b6b" providerId="ADAL" clId="{ED25B4B7-1C53-4AC8-A0AD-673D8F6F5461}" dt="2020-12-06T09:36:31.038" v="39" actId="20577"/>
-          <ac:spMkLst>
-            <pc:docMk/>
-            <pc:sldMk cId="851380115" sldId="273"/>
-            <ac:spMk id="3" creationId="{9CB082E7-7EDA-4A5C-9875-AE1731E9ECAD}"/>
-          </ac:spMkLst>
-        </pc:spChg>
-        <pc:spChg chg="mod">
-          <ac:chgData name="Aaron Dinnage" userId="8cb68394-1244-40dc-97d1-6a2511d83b6b" providerId="ADAL" clId="{ED25B4B7-1C53-4AC8-A0AD-673D8F6F5461}" dt="2020-12-06T09:36:04.497" v="27" actId="1076"/>
-          <ac:spMkLst>
-            <pc:docMk/>
-            <pc:sldMk cId="851380115" sldId="273"/>
-            <ac:spMk id="4" creationId="{30DF9CE2-C0D2-4560-936D-D9112B0B9BFA}"/>
-          </ac:spMkLst>
-        </pc:spChg>
-      </pc:sldChg>
-      <pc:sldChg chg="add ord">
-        <pc:chgData name="Aaron Dinnage" userId="8cb68394-1244-40dc-97d1-6a2511d83b6b" providerId="ADAL" clId="{ED25B4B7-1C53-4AC8-A0AD-673D8F6F5461}" dt="2020-12-06T09:36:57.235" v="42"/>
-        <pc:sldMkLst>
-          <pc:docMk/>
-          <pc:sldMk cId="3737083648" sldId="277"/>
-        </pc:sldMkLst>
-      </pc:sldChg>
-    </pc:docChg>
-  </pc:docChgLst>
-</pc:chgInfo>
 </file>
 
 <file path=ppt/notesMasters/notesMaster1.xml><?xml version="1.0" encoding="utf-8"?>
@@ -440,7 +228,7 @@
           <a:p>
             <a:fld id="{5501C88C-2D47-4607-965A-262E2CFCF213}" type="datetimeFigureOut">
               <a:rPr lang="en-AU" smtClean="0"/>
-              <a:t>6/12/2020</a:t>
+              <a:t>9/02/2021</a:t>
             </a:fld>
             <a:endParaRPr lang="en-AU"/>
           </a:p>
@@ -1061,6 +849,90 @@
 </p:notes>
 </file>
 
+<file path=ppt/notesSlides/notesSlide5.xml><?xml version="1.0" encoding="utf-8"?>
+<p:notes xmlns:a="http://schemas.openxmlformats.org/drawingml/2006/main" xmlns:r="http://schemas.openxmlformats.org/officeDocument/2006/relationships" xmlns:p="http://schemas.openxmlformats.org/presentationml/2006/main">
+  <p:cSld>
+    <p:spTree>
+      <p:nvGrpSpPr>
+        <p:cNvPr id="1" name=""/>
+        <p:cNvGrpSpPr/>
+        <p:nvPr/>
+      </p:nvGrpSpPr>
+      <p:grpSpPr>
+        <a:xfrm>
+          <a:off x="0" y="0"/>
+          <a:ext cx="0" cy="0"/>
+          <a:chOff x="0" y="0"/>
+          <a:chExt cx="0" cy="0"/>
+        </a:xfrm>
+      </p:grpSpPr>
+      <p:sp>
+        <p:nvSpPr>
+          <p:cNvPr id="2" name="Slide Image Placeholder 1"/>
+          <p:cNvSpPr>
+            <a:spLocks noGrp="1" noRot="1" noChangeAspect="1"/>
+          </p:cNvSpPr>
+          <p:nvPr>
+            <p:ph type="sldImg"/>
+          </p:nvPr>
+        </p:nvSpPr>
+        <p:spPr/>
+      </p:sp>
+      <p:sp>
+        <p:nvSpPr>
+          <p:cNvPr id="3" name="Notes Placeholder 2"/>
+          <p:cNvSpPr>
+            <a:spLocks noGrp="1"/>
+          </p:cNvSpPr>
+          <p:nvPr>
+            <p:ph type="body" idx="1"/>
+          </p:nvPr>
+        </p:nvSpPr>
+        <p:spPr/>
+        <p:txBody>
+          <a:bodyPr/>
+          <a:lstStyle/>
+          <a:p>
+            <a:endParaRPr lang="en-AU" dirty="0"/>
+          </a:p>
+        </p:txBody>
+      </p:sp>
+      <p:sp>
+        <p:nvSpPr>
+          <p:cNvPr id="4" name="Slide Number Placeholder 3"/>
+          <p:cNvSpPr>
+            <a:spLocks noGrp="1"/>
+          </p:cNvSpPr>
+          <p:nvPr>
+            <p:ph type="sldNum" sz="quarter" idx="5"/>
+          </p:nvPr>
+        </p:nvSpPr>
+        <p:spPr/>
+        <p:txBody>
+          <a:bodyPr/>
+          <a:lstStyle/>
+          <a:p>
+            <a:fld id="{AF425AC4-1A55-4759-824E-616F9E627713}" type="slidenum">
+              <a:rPr lang="en-US" smtClean="0"/>
+              <a:t>6</a:t>
+            </a:fld>
+            <a:endParaRPr lang="en-US"/>
+          </a:p>
+        </p:txBody>
+      </p:sp>
+    </p:spTree>
+    <p:extLst>
+      <p:ext uri="{BB962C8B-B14F-4D97-AF65-F5344CB8AC3E}">
+        <p14:creationId xmlns:p14="http://schemas.microsoft.com/office/powerpoint/2010/main" val="745044342"/>
+      </p:ext>
+    </p:extLst>
+  </p:cSld>
+  <p:clrMapOvr>
+    <a:masterClrMapping/>
+  </p:clrMapOvr>
+</p:notes>
+</file>
+
 <file path=ppt/slideLayouts/slideLayout1.xml><?xml version="1.0" encoding="utf-8"?>
 <p:sldLayout xmlns:a="http://schemas.openxmlformats.org/drawingml/2006/main" xmlns:r="http://schemas.openxmlformats.org/officeDocument/2006/relationships" xmlns:p="http://schemas.openxmlformats.org/presentationml/2006/main" type="title" preserve="1">
   <p:cSld name="Title Slide">
@@ -1210,7 +1082,7 @@
           <a:p>
             <a:fld id="{5A8F0079-C155-4963-BA90-8B06FFA7587C}" type="datetimeFigureOut">
               <a:rPr lang="en-AU" smtClean="0"/>
-              <a:t>6/12/2020</a:t>
+              <a:t>9/02/2021</a:t>
             </a:fld>
             <a:endParaRPr lang="en-AU"/>
           </a:p>
@@ -1410,7 +1282,7 @@
           <a:p>
             <a:fld id="{5A8F0079-C155-4963-BA90-8B06FFA7587C}" type="datetimeFigureOut">
               <a:rPr lang="en-AU" smtClean="0"/>
-              <a:t>6/12/2020</a:t>
+              <a:t>9/02/2021</a:t>
             </a:fld>
             <a:endParaRPr lang="en-AU"/>
           </a:p>
@@ -1620,7 +1492,7 @@
           <a:p>
             <a:fld id="{5A8F0079-C155-4963-BA90-8B06FFA7587C}" type="datetimeFigureOut">
               <a:rPr lang="en-AU" smtClean="0"/>
-              <a:t>6/12/2020</a:t>
+              <a:t>9/02/2021</a:t>
             </a:fld>
             <a:endParaRPr lang="en-AU"/>
           </a:p>
@@ -1820,7 +1692,7 @@
           <a:p>
             <a:fld id="{5A8F0079-C155-4963-BA90-8B06FFA7587C}" type="datetimeFigureOut">
               <a:rPr lang="en-AU" smtClean="0"/>
-              <a:t>6/12/2020</a:t>
+              <a:t>9/02/2021</a:t>
             </a:fld>
             <a:endParaRPr lang="en-AU"/>
           </a:p>
@@ -2096,7 +1968,7 @@
           <a:p>
             <a:fld id="{5A8F0079-C155-4963-BA90-8B06FFA7587C}" type="datetimeFigureOut">
               <a:rPr lang="en-AU" smtClean="0"/>
-              <a:t>6/12/2020</a:t>
+              <a:t>9/02/2021</a:t>
             </a:fld>
             <a:endParaRPr lang="en-AU"/>
           </a:p>
@@ -2364,7 +2236,7 @@
           <a:p>
             <a:fld id="{5A8F0079-C155-4963-BA90-8B06FFA7587C}" type="datetimeFigureOut">
               <a:rPr lang="en-AU" smtClean="0"/>
-              <a:t>6/12/2020</a:t>
+              <a:t>9/02/2021</a:t>
             </a:fld>
             <a:endParaRPr lang="en-AU"/>
           </a:p>
@@ -2779,7 +2651,7 @@
           <a:p>
             <a:fld id="{5A8F0079-C155-4963-BA90-8B06FFA7587C}" type="datetimeFigureOut">
               <a:rPr lang="en-AU" smtClean="0"/>
-              <a:t>6/12/2020</a:t>
+              <a:t>9/02/2021</a:t>
             </a:fld>
             <a:endParaRPr lang="en-AU"/>
           </a:p>
@@ -2921,7 +2793,7 @@
           <a:p>
             <a:fld id="{5A8F0079-C155-4963-BA90-8B06FFA7587C}" type="datetimeFigureOut">
               <a:rPr lang="en-AU" smtClean="0"/>
-              <a:t>6/12/2020</a:t>
+              <a:t>9/02/2021</a:t>
             </a:fld>
             <a:endParaRPr lang="en-AU"/>
           </a:p>
@@ -3034,7 +2906,7 @@
           <a:p>
             <a:fld id="{5A8F0079-C155-4963-BA90-8B06FFA7587C}" type="datetimeFigureOut">
               <a:rPr lang="en-AU" smtClean="0"/>
-              <a:t>6/12/2020</a:t>
+              <a:t>9/02/2021</a:t>
             </a:fld>
             <a:endParaRPr lang="en-AU"/>
           </a:p>
@@ -3347,7 +3219,7 @@
           <a:p>
             <a:fld id="{5A8F0079-C155-4963-BA90-8B06FFA7587C}" type="datetimeFigureOut">
               <a:rPr lang="en-AU" smtClean="0"/>
-              <a:t>6/12/2020</a:t>
+              <a:t>9/02/2021</a:t>
             </a:fld>
             <a:endParaRPr lang="en-AU"/>
           </a:p>
@@ -3636,7 +3508,7 @@
           <a:p>
             <a:fld id="{5A8F0079-C155-4963-BA90-8B06FFA7587C}" type="datetimeFigureOut">
               <a:rPr lang="en-AU" smtClean="0"/>
-              <a:t>6/12/2020</a:t>
+              <a:t>9/02/2021</a:t>
             </a:fld>
             <a:endParaRPr lang="en-AU"/>
           </a:p>
@@ -3879,7 +3751,7 @@
           <a:p>
             <a:fld id="{5A8F0079-C155-4963-BA90-8B06FFA7587C}" type="datetimeFigureOut">
               <a:rPr lang="en-AU" smtClean="0"/>
-              <a:t>6/12/2020</a:t>
+              <a:t>9/02/2021</a:t>
             </a:fld>
             <a:endParaRPr lang="en-AU"/>
           </a:p>
@@ -4360,7 +4232,7 @@
           <a:p>
             <a:r>
               <a:rPr lang="en-AU" dirty="0"/>
-              <a:t>December 2020</a:t>
+              <a:t>February 2021</a:t>
             </a:r>
           </a:p>
         </p:txBody>
@@ -4379,8 +4251,8 @@
         </p:nvSpPr>
         <p:spPr>
           <a:xfrm>
-            <a:off x="4187474" y="4979553"/>
-            <a:ext cx="3817052" cy="556494"/>
+            <a:off x="4742754" y="4979553"/>
+            <a:ext cx="2706492" cy="556494"/>
           </a:xfrm>
           <a:prstGeom prst="rect">
             <a:avLst/>
@@ -4428,15 +4300,9 @@
                     <a:lumMod val="50000"/>
                   </a:schemeClr>
                 </a:solidFill>
-                <a:hlinkClick r:id="rId2">
-                  <a:extLst>
-                    <a:ext uri="{A12FA001-AC4F-418D-AE19-62706E023703}">
-                      <ahyp:hlinkClr xmlns:ahyp="http://schemas.microsoft.com/office/drawing/2018/hyperlinkcolor" val="tx"/>
-                    </a:ext>
-                  </a:extLst>
-                </a:hlinkClick>
+                <a:hlinkClick r:id="rId2"/>
               </a:rPr>
-              <a:t>https://github.com/AaronDinnage/Licensing</a:t>
+              <a:t>https://m365maps.com</a:t>
             </a:r>
             <a:endParaRPr lang="en-AU" sz="1600" dirty="0">
               <a:solidFill>
@@ -4504,8 +4370,8 @@
         </p:nvSpPr>
         <p:spPr>
           <a:xfrm>
-            <a:off x="8207702" y="6696999"/>
-            <a:ext cx="3986201" cy="161001"/>
+            <a:off x="9454538" y="6696999"/>
+            <a:ext cx="2737462" cy="161001"/>
           </a:xfrm>
           <a:prstGeom prst="rect">
             <a:avLst/>
@@ -4543,15 +4409,9 @@
                     <a:lumMod val="50000"/>
                   </a:schemeClr>
                 </a:solidFill>
-                <a:hlinkClick r:id="rId3">
-                  <a:extLst>
-                    <a:ext uri="{A12FA001-AC4F-418D-AE19-62706E023703}">
-                      <ahyp:hlinkClr xmlns:ahyp="http://schemas.microsoft.com/office/drawing/2018/hyperlinkcolor" val="tx"/>
-                    </a:ext>
-                  </a:extLst>
-                </a:hlinkClick>
+                <a:hlinkClick r:id="rId3"/>
               </a:rPr>
-              <a:t>https://github.com/AaronDinnage/Licensing</a:t>
+              <a:t>https://m365maps.com</a:t>
             </a:r>
             <a:endParaRPr lang="en-AU" sz="900" dirty="0">
               <a:solidFill>
@@ -4565,10 +4425,10 @@
       </p:sp>
       <p:pic>
         <p:nvPicPr>
-          <p:cNvPr id="6" name="Picture 5">
-            <a:extLst>
-              <a:ext uri="{FF2B5EF4-FFF2-40B4-BE49-F238E27FC236}">
-                <a16:creationId xmlns:a16="http://schemas.microsoft.com/office/drawing/2014/main" id="{689B9B48-51C7-45C5-A4E1-408F3297D630}"/>
+          <p:cNvPr id="5" name="Picture 4" descr="A screenshot of a computer&#10;&#10;Description automatically generated with low confidence">
+            <a:extLst>
+              <a:ext uri="{FF2B5EF4-FFF2-40B4-BE49-F238E27FC236}">
+                <a16:creationId xmlns:a16="http://schemas.microsoft.com/office/drawing/2014/main" id="{C57C1291-ECCC-4569-94CE-E50FFE5E4346}"/>
               </a:ext>
             </a:extLst>
           </p:cNvPr>
@@ -4577,16 +4437,21 @@
           </p:cNvPicPr>
           <p:nvPr/>
         </p:nvPicPr>
-        <p:blipFill>
-          <a:blip r:embed="rId4"/>
-          <a:stretch>
-            <a:fillRect/>
-          </a:stretch>
+        <p:blipFill rotWithShape="1">
+          <a:blip r:embed="rId4">
+            <a:extLst>
+              <a:ext uri="{28A0092B-C50C-407E-A947-70E740481C1C}">
+                <a14:useLocalDpi xmlns:a14="http://schemas.microsoft.com/office/drawing/2010/main" val="0"/>
+              </a:ext>
+            </a:extLst>
+          </a:blip>
+          <a:srcRect t="15738"/>
+          <a:stretch/>
         </p:blipFill>
         <p:spPr>
           <a:xfrm>
-            <a:off x="0" y="593964"/>
-            <a:ext cx="12192000" cy="5670072"/>
+            <a:off x="0" y="594272"/>
+            <a:ext cx="12192000" cy="5669457"/>
           </a:xfrm>
           <a:prstGeom prst="rect">
             <a:avLst/>
@@ -4635,52 +4500,22 @@
           <a:chExt cx="0" cy="0"/>
         </a:xfrm>
       </p:grpSpPr>
-      <p:pic>
-        <p:nvPicPr>
-          <p:cNvPr id="5" name="Picture 4">
-            <a:extLst>
-              <a:ext uri="{FF2B5EF4-FFF2-40B4-BE49-F238E27FC236}">
-                <a16:creationId xmlns:a16="http://schemas.microsoft.com/office/drawing/2014/main" id="{1A3D8FDE-254B-47FD-B61D-C0E676906DD8}"/>
-              </a:ext>
-            </a:extLst>
-          </p:cNvPr>
-          <p:cNvPicPr>
-            <a:picLocks noChangeAspect="1"/>
-          </p:cNvPicPr>
+      <p:sp>
+        <p:nvSpPr>
+          <p:cNvPr id="4" name="Link">
+            <a:extLst>
+              <a:ext uri="{FF2B5EF4-FFF2-40B4-BE49-F238E27FC236}">
+                <a16:creationId xmlns:a16="http://schemas.microsoft.com/office/drawing/2014/main" id="{78CCF3D1-0D3D-45AB-84FF-D279155CB1F6}"/>
+              </a:ext>
+            </a:extLst>
+          </p:cNvPr>
+          <p:cNvSpPr txBox="1"/>
           <p:nvPr/>
-        </p:nvPicPr>
-        <p:blipFill>
-          <a:blip r:embed="rId3"/>
-          <a:stretch>
-            <a:fillRect/>
-          </a:stretch>
-        </p:blipFill>
+        </p:nvSpPr>
         <p:spPr>
           <a:xfrm>
-            <a:off x="0" y="2611"/>
-            <a:ext cx="12192000" cy="6694388"/>
-          </a:xfrm>
-          <a:prstGeom prst="rect">
-            <a:avLst/>
-          </a:prstGeom>
-        </p:spPr>
-      </p:pic>
-      <p:sp>
-        <p:nvSpPr>
-          <p:cNvPr id="7" name="Link">
-            <a:extLst>
-              <a:ext uri="{FF2B5EF4-FFF2-40B4-BE49-F238E27FC236}">
-                <a16:creationId xmlns:a16="http://schemas.microsoft.com/office/drawing/2014/main" id="{69C4F443-C1DA-435C-BCC1-181815DDC7DB}"/>
-              </a:ext>
-            </a:extLst>
-          </p:cNvPr>
-          <p:cNvSpPr txBox="1"/>
-          <p:nvPr/>
-        </p:nvSpPr>
-        <p:spPr>
-          <a:xfrm>
-            <a:off x="8207702" y="6696999"/>
-            <a:ext cx="3986201" cy="161001"/>
+            <a:off x="9454538" y="6696999"/>
+            <a:ext cx="2737462" cy="161001"/>
           </a:xfrm>
           <a:prstGeom prst="rect">
             <a:avLst/>
@@ -4718,15 +4553,9 @@
                     <a:lumMod val="50000"/>
                   </a:schemeClr>
                 </a:solidFill>
-                <a:hlinkClick r:id="rId4">
-                  <a:extLst>
-                    <a:ext uri="{A12FA001-AC4F-418D-AE19-62706E023703}">
-                      <ahyp:hlinkClr xmlns:ahyp="http://schemas.microsoft.com/office/drawing/2018/hyperlinkcolor" val="tx"/>
-                    </a:ext>
-                  </a:extLst>
-                </a:hlinkClick>
+                <a:hlinkClick r:id="rId3"/>
               </a:rPr>
-              <a:t>https://github.com/AaronDinnage/Licensing</a:t>
+              <a:t>https://m365maps.com</a:t>
             </a:r>
             <a:endParaRPr lang="en-AU" sz="900" dirty="0">
               <a:solidFill>
@@ -4738,6 +4567,41 @@
           </a:p>
         </p:txBody>
       </p:sp>
+      <p:pic>
+        <p:nvPicPr>
+          <p:cNvPr id="5" name="Picture 4" descr="Table, calendar&#10;&#10;Description automatically generated">
+            <a:extLst>
+              <a:ext uri="{FF2B5EF4-FFF2-40B4-BE49-F238E27FC236}">
+                <a16:creationId xmlns:a16="http://schemas.microsoft.com/office/drawing/2014/main" id="{7816A5A4-E82A-4D53-870C-573F5553B8A4}"/>
+              </a:ext>
+            </a:extLst>
+          </p:cNvPr>
+          <p:cNvPicPr>
+            <a:picLocks noChangeAspect="1"/>
+          </p:cNvPicPr>
+          <p:nvPr/>
+        </p:nvPicPr>
+        <p:blipFill rotWithShape="1">
+          <a:blip r:embed="rId4">
+            <a:extLst>
+              <a:ext uri="{28A0092B-C50C-407E-A947-70E740481C1C}">
+                <a14:useLocalDpi xmlns:a14="http://schemas.microsoft.com/office/drawing/2010/main" val="0"/>
+              </a:ext>
+            </a:extLst>
+          </a:blip>
+          <a:srcRect t="11899"/>
+          <a:stretch/>
+        </p:blipFill>
+        <p:spPr>
+          <a:xfrm>
+            <a:off x="0" y="39328"/>
+            <a:ext cx="12192000" cy="6611977"/>
+          </a:xfrm>
+          <a:prstGeom prst="rect">
+            <a:avLst/>
+          </a:prstGeom>
+        </p:spPr>
+      </p:pic>
     </p:spTree>
     <p:extLst>
       <p:ext uri="{BB962C8B-B14F-4D97-AF65-F5344CB8AC3E}">
@@ -4782,10 +4646,10 @@
       </p:grpSpPr>
       <p:sp>
         <p:nvSpPr>
-          <p:cNvPr id="2" name="Link">
-            <a:extLst>
-              <a:ext uri="{FF2B5EF4-FFF2-40B4-BE49-F238E27FC236}">
-                <a16:creationId xmlns:a16="http://schemas.microsoft.com/office/drawing/2014/main" id="{2BC34E5F-F4C8-49DF-A245-16AB6D25318D}"/>
+          <p:cNvPr id="4" name="Link">
+            <a:extLst>
+              <a:ext uri="{FF2B5EF4-FFF2-40B4-BE49-F238E27FC236}">
+                <a16:creationId xmlns:a16="http://schemas.microsoft.com/office/drawing/2014/main" id="{EDF86CD7-B397-4B05-877E-C7540EA7E0C4}"/>
               </a:ext>
             </a:extLst>
           </p:cNvPr>
@@ -4794,8 +4658,8 @@
         </p:nvSpPr>
         <p:spPr>
           <a:xfrm>
-            <a:off x="8207702" y="6696999"/>
-            <a:ext cx="3986201" cy="161001"/>
+            <a:off x="9454538" y="6696999"/>
+            <a:ext cx="2737462" cy="161001"/>
           </a:xfrm>
           <a:prstGeom prst="rect">
             <a:avLst/>
@@ -4833,15 +4697,9 @@
                     <a:lumMod val="50000"/>
                   </a:schemeClr>
                 </a:solidFill>
-                <a:hlinkClick r:id="rId3">
-                  <a:extLst>
-                    <a:ext uri="{A12FA001-AC4F-418D-AE19-62706E023703}">
-                      <ahyp:hlinkClr xmlns:ahyp="http://schemas.microsoft.com/office/drawing/2018/hyperlinkcolor" val="tx"/>
-                    </a:ext>
-                  </a:extLst>
-                </a:hlinkClick>
+                <a:hlinkClick r:id="rId3"/>
               </a:rPr>
-              <a:t>https://github.com/AaronDinnage/Licensing</a:t>
+              <a:t>https://m365maps.com</a:t>
             </a:r>
             <a:endParaRPr lang="en-AU" sz="900" dirty="0">
               <a:solidFill>
@@ -4855,10 +4713,10 @@
       </p:sp>
       <p:pic>
         <p:nvPicPr>
-          <p:cNvPr id="3" name="Picture 2">
-            <a:extLst>
-              <a:ext uri="{FF2B5EF4-FFF2-40B4-BE49-F238E27FC236}">
-                <a16:creationId xmlns:a16="http://schemas.microsoft.com/office/drawing/2014/main" id="{B63577D0-5E42-42DC-811B-6A69F89FE748}"/>
+          <p:cNvPr id="5" name="Picture 4" descr="Graphical user interface&#10;&#10;Description automatically generated with medium confidence">
+            <a:extLst>
+              <a:ext uri="{FF2B5EF4-FFF2-40B4-BE49-F238E27FC236}">
+                <a16:creationId xmlns:a16="http://schemas.microsoft.com/office/drawing/2014/main" id="{0846A18D-C0F8-4FB3-BA3A-E504364BB6AE}"/>
               </a:ext>
             </a:extLst>
           </p:cNvPr>
@@ -4867,16 +4725,21 @@
           </p:cNvPicPr>
           <p:nvPr/>
         </p:nvPicPr>
-        <p:blipFill>
-          <a:blip r:embed="rId4"/>
-          <a:stretch>
-            <a:fillRect/>
-          </a:stretch>
+        <p:blipFill rotWithShape="1">
+          <a:blip r:embed="rId4">
+            <a:extLst>
+              <a:ext uri="{28A0092B-C50C-407E-A947-70E740481C1C}">
+                <a14:useLocalDpi xmlns:a14="http://schemas.microsoft.com/office/drawing/2010/main" val="0"/>
+              </a:ext>
+            </a:extLst>
+          </a:blip>
+          <a:srcRect t="15914"/>
+          <a:stretch/>
         </p:blipFill>
         <p:spPr>
           <a:xfrm>
-            <a:off x="0" y="343911"/>
-            <a:ext cx="12192000" cy="6170177"/>
+            <a:off x="0" y="331044"/>
+            <a:ext cx="12192000" cy="6195913"/>
           </a:xfrm>
           <a:prstGeom prst="rect">
             <a:avLst/>
@@ -4927,10 +4790,10 @@
       </p:grpSpPr>
       <p:sp>
         <p:nvSpPr>
-          <p:cNvPr id="2" name="Link">
-            <a:extLst>
-              <a:ext uri="{FF2B5EF4-FFF2-40B4-BE49-F238E27FC236}">
-                <a16:creationId xmlns:a16="http://schemas.microsoft.com/office/drawing/2014/main" id="{2BC34E5F-F4C8-49DF-A245-16AB6D25318D}"/>
+          <p:cNvPr id="4" name="Link">
+            <a:extLst>
+              <a:ext uri="{FF2B5EF4-FFF2-40B4-BE49-F238E27FC236}">
+                <a16:creationId xmlns:a16="http://schemas.microsoft.com/office/drawing/2014/main" id="{1DE1EA15-0E87-4788-9ECA-83284C573D5E}"/>
               </a:ext>
             </a:extLst>
           </p:cNvPr>
@@ -4939,8 +4802,8 @@
         </p:nvSpPr>
         <p:spPr>
           <a:xfrm>
-            <a:off x="8207702" y="6696999"/>
-            <a:ext cx="3986201" cy="161001"/>
+            <a:off x="9454538" y="6696999"/>
+            <a:ext cx="2737462" cy="161001"/>
           </a:xfrm>
           <a:prstGeom prst="rect">
             <a:avLst/>
@@ -4978,15 +4841,9 @@
                     <a:lumMod val="50000"/>
                   </a:schemeClr>
                 </a:solidFill>
-                <a:hlinkClick r:id="rId3">
-                  <a:extLst>
-                    <a:ext uri="{A12FA001-AC4F-418D-AE19-62706E023703}">
-                      <ahyp:hlinkClr xmlns:ahyp="http://schemas.microsoft.com/office/drawing/2018/hyperlinkcolor" val="tx"/>
-                    </a:ext>
-                  </a:extLst>
-                </a:hlinkClick>
+                <a:hlinkClick r:id="rId3"/>
               </a:rPr>
-              <a:t>https://github.com/AaronDinnage/Licensing</a:t>
+              <a:t>https://m365maps.com</a:t>
             </a:r>
             <a:endParaRPr lang="en-AU" sz="900" dirty="0">
               <a:solidFill>
@@ -5000,10 +4857,10 @@
       </p:sp>
       <p:pic>
         <p:nvPicPr>
-          <p:cNvPr id="3" name="Picture 2">
-            <a:extLst>
-              <a:ext uri="{FF2B5EF4-FFF2-40B4-BE49-F238E27FC236}">
-                <a16:creationId xmlns:a16="http://schemas.microsoft.com/office/drawing/2014/main" id="{7D628F2D-1F73-4E22-ADA1-03984CC11C94}"/>
+          <p:cNvPr id="5" name="Picture 4" descr="Graphical user interface, table&#10;&#10;Description automatically generated">
+            <a:extLst>
+              <a:ext uri="{FF2B5EF4-FFF2-40B4-BE49-F238E27FC236}">
+                <a16:creationId xmlns:a16="http://schemas.microsoft.com/office/drawing/2014/main" id="{C4F8768C-DE3E-4EC6-BE8E-DEB2EB7198B0}"/>
               </a:ext>
             </a:extLst>
           </p:cNvPr>
@@ -5012,16 +4869,21 @@
           </p:cNvPicPr>
           <p:nvPr/>
         </p:nvPicPr>
-        <p:blipFill>
-          <a:blip r:embed="rId4"/>
-          <a:stretch>
-            <a:fillRect/>
-          </a:stretch>
+        <p:blipFill rotWithShape="1">
+          <a:blip r:embed="rId4">
+            <a:extLst>
+              <a:ext uri="{28A0092B-C50C-407E-A947-70E740481C1C}">
+                <a14:useLocalDpi xmlns:a14="http://schemas.microsoft.com/office/drawing/2010/main" val="0"/>
+              </a:ext>
+            </a:extLst>
+          </a:blip>
+          <a:srcRect t="15112"/>
+          <a:stretch/>
         </p:blipFill>
         <p:spPr>
           <a:xfrm>
-            <a:off x="0" y="495328"/>
-            <a:ext cx="12192000" cy="5867344"/>
+            <a:off x="0" y="487812"/>
+            <a:ext cx="12191999" cy="5882376"/>
           </a:xfrm>
           <a:prstGeom prst="rect">
             <a:avLst/>
@@ -5072,10 +4934,10 @@
       </p:grpSpPr>
       <p:sp>
         <p:nvSpPr>
-          <p:cNvPr id="8" name="Link">
-            <a:extLst>
-              <a:ext uri="{FF2B5EF4-FFF2-40B4-BE49-F238E27FC236}">
-                <a16:creationId xmlns:a16="http://schemas.microsoft.com/office/drawing/2014/main" id="{98EE8C32-6091-4EEB-98D4-3E7049F8023A}"/>
+          <p:cNvPr id="4" name="Link">
+            <a:extLst>
+              <a:ext uri="{FF2B5EF4-FFF2-40B4-BE49-F238E27FC236}">
+                <a16:creationId xmlns:a16="http://schemas.microsoft.com/office/drawing/2014/main" id="{1DE1EA15-0E87-4788-9ECA-83284C573D5E}"/>
               </a:ext>
             </a:extLst>
           </p:cNvPr>
@@ -5084,8 +4946,8 @@
         </p:nvSpPr>
         <p:spPr>
           <a:xfrm>
-            <a:off x="8207702" y="6696999"/>
-            <a:ext cx="3986201" cy="161001"/>
+            <a:off x="9454538" y="6696999"/>
+            <a:ext cx="2737462" cy="161001"/>
           </a:xfrm>
           <a:prstGeom prst="rect">
             <a:avLst/>
@@ -5123,15 +4985,9 @@
                     <a:lumMod val="50000"/>
                   </a:schemeClr>
                 </a:solidFill>
-                <a:hlinkClick r:id="rId2">
-                  <a:extLst>
-                    <a:ext uri="{A12FA001-AC4F-418D-AE19-62706E023703}">
-                      <ahyp:hlinkClr xmlns:ahyp="http://schemas.microsoft.com/office/drawing/2018/hyperlinkcolor" val="tx"/>
-                    </a:ext>
-                  </a:extLst>
-                </a:hlinkClick>
+                <a:hlinkClick r:id="rId3"/>
               </a:rPr>
-              <a:t>https://github.com/AaronDinnage/Licensing</a:t>
+              <a:t>https://m365maps.com</a:t>
             </a:r>
             <a:endParaRPr lang="en-AU" sz="900" dirty="0">
               <a:solidFill>
@@ -5145,10 +5001,10 @@
       </p:sp>
       <p:pic>
         <p:nvPicPr>
-          <p:cNvPr id="3" name="Enterprise Benefits" descr="Enterprise Benefits">
-            <a:extLst>
-              <a:ext uri="{FF2B5EF4-FFF2-40B4-BE49-F238E27FC236}">
-                <a16:creationId xmlns:a16="http://schemas.microsoft.com/office/drawing/2014/main" id="{06BB443D-ABDE-445E-9EED-FB7ACB7C6B0B}"/>
+          <p:cNvPr id="5" name="Picture 4" descr="Table, calendar&#10;&#10;Description automatically generated">
+            <a:extLst>
+              <a:ext uri="{FF2B5EF4-FFF2-40B4-BE49-F238E27FC236}">
+                <a16:creationId xmlns:a16="http://schemas.microsoft.com/office/drawing/2014/main" id="{BA39DA5F-A5D8-4B75-9B67-8F8D925F80C1}"/>
               </a:ext>
             </a:extLst>
           </p:cNvPr>
@@ -5157,86 +5013,21 @@
           </p:cNvPicPr>
           <p:nvPr/>
         </p:nvPicPr>
-        <p:blipFill>
-          <a:blip r:embed="rId3"/>
-          <a:stretch>
-            <a:fillRect/>
-          </a:stretch>
+        <p:blipFill rotWithShape="1">
+          <a:blip r:embed="rId4">
+            <a:extLst>
+              <a:ext uri="{28A0092B-C50C-407E-A947-70E740481C1C}">
+                <a14:useLocalDpi xmlns:a14="http://schemas.microsoft.com/office/drawing/2010/main" val="0"/>
+              </a:ext>
+            </a:extLst>
+          </a:blip>
+          <a:srcRect t="13296"/>
+          <a:stretch/>
         </p:blipFill>
         <p:spPr>
           <a:xfrm>
-            <a:off x="1854403" y="2059871"/>
-            <a:ext cx="4540360" cy="4052194"/>
-          </a:xfrm>
-          <a:prstGeom prst="rect">
-            <a:avLst/>
-          </a:prstGeom>
-        </p:spPr>
-      </p:pic>
-      <p:sp>
-        <p:nvSpPr>
-          <p:cNvPr id="2" name="Title">
-            <a:extLst>
-              <a:ext uri="{FF2B5EF4-FFF2-40B4-BE49-F238E27FC236}">
-                <a16:creationId xmlns:a16="http://schemas.microsoft.com/office/drawing/2014/main" id="{67D97FFD-C060-4DB0-B692-9BB5BF1C264A}"/>
-              </a:ext>
-            </a:extLst>
-          </p:cNvPr>
-          <p:cNvSpPr>
-            <a:spLocks noGrp="1"/>
-          </p:cNvSpPr>
-          <p:nvPr>
-            <p:ph type="title"/>
-          </p:nvPr>
-        </p:nvSpPr>
-        <p:spPr>
-          <a:xfrm>
-            <a:off x="838200" y="365125"/>
-            <a:ext cx="7043228" cy="1325563"/>
-          </a:xfrm>
-        </p:spPr>
-        <p:txBody>
-          <a:bodyPr/>
-          <a:lstStyle/>
-          <a:p>
-            <a:r>
-              <a:rPr lang="en-AU" dirty="0"/>
-              <a:t>Microsoft 365 Benefits</a:t>
-            </a:r>
-            <a:br>
-              <a:rPr lang="en-AU" dirty="0"/>
-            </a:br>
-            <a:r>
-              <a:rPr lang="en-AU" dirty="0"/>
-              <a:t>and Related Services</a:t>
-            </a:r>
-          </a:p>
-        </p:txBody>
-      </p:sp>
-      <p:pic>
-        <p:nvPicPr>
-          <p:cNvPr id="4" name="Picture 3">
-            <a:extLst>
-              <a:ext uri="{FF2B5EF4-FFF2-40B4-BE49-F238E27FC236}">
-                <a16:creationId xmlns:a16="http://schemas.microsoft.com/office/drawing/2014/main" id="{1DEE5889-E7AA-49A3-AFFC-17CFB52E0803}"/>
-              </a:ext>
-            </a:extLst>
-          </p:cNvPr>
-          <p:cNvPicPr>
-            <a:picLocks noChangeAspect="1"/>
-          </p:cNvPicPr>
-          <p:nvPr/>
-        </p:nvPicPr>
-        <p:blipFill>
-          <a:blip r:embed="rId4"/>
-          <a:stretch>
-            <a:fillRect/>
-          </a:stretch>
-        </p:blipFill>
-        <p:spPr>
-          <a:xfrm>
-            <a:off x="8207702" y="365124"/>
-            <a:ext cx="2630328" cy="6127751"/>
+            <a:off x="0" y="470953"/>
+            <a:ext cx="12192000" cy="5916094"/>
           </a:xfrm>
           <a:prstGeom prst="rect">
             <a:avLst/>
@@ -5246,7 +5037,7 @@
     </p:spTree>
     <p:extLst>
       <p:ext uri="{BB962C8B-B14F-4D97-AF65-F5344CB8AC3E}">
-        <p14:creationId xmlns:p14="http://schemas.microsoft.com/office/powerpoint/2010/main" val="2245115415"/>
+        <p14:creationId xmlns:p14="http://schemas.microsoft.com/office/powerpoint/2010/main" val="3634016083"/>
       </p:ext>
     </p:extLst>
   </p:cSld>
@@ -5287,10 +5078,10 @@
       </p:grpSpPr>
       <p:sp>
         <p:nvSpPr>
-          <p:cNvPr id="4" name="Title 3">
-            <a:extLst>
-              <a:ext uri="{FF2B5EF4-FFF2-40B4-BE49-F238E27FC236}">
-                <a16:creationId xmlns:a16="http://schemas.microsoft.com/office/drawing/2014/main" id="{E725C983-1262-45C1-97B6-EA1476569104}"/>
+          <p:cNvPr id="2" name="Title">
+            <a:extLst>
+              <a:ext uri="{FF2B5EF4-FFF2-40B4-BE49-F238E27FC236}">
+                <a16:creationId xmlns:a16="http://schemas.microsoft.com/office/drawing/2014/main" id="{67D97FFD-C060-4DB0-B692-9BB5BF1C264A}"/>
               </a:ext>
             </a:extLst>
           </p:cNvPr>
@@ -5303,8 +5094,8 @@
         </p:nvSpPr>
         <p:spPr>
           <a:xfrm>
-            <a:off x="831850" y="490451"/>
-            <a:ext cx="10515600" cy="5669279"/>
+            <a:off x="230487" y="365125"/>
+            <a:ext cx="11731027" cy="1325563"/>
           </a:xfrm>
         </p:spPr>
         <p:txBody>
@@ -5315,7 +5106,207 @@
           <a:p>
             <a:r>
               <a:rPr lang="en-AU" dirty="0"/>
-              <a:t>Content on GitHub</a:t>
+              <a:t>Microsoft 365 Enterprise Benefits,</a:t>
+            </a:r>
+            <a:br>
+              <a:rPr lang="en-AU" dirty="0"/>
+            </a:br>
+            <a:r>
+              <a:rPr lang="en-AU" dirty="0"/>
+              <a:t>Microsoft Viva, and Related Services</a:t>
+            </a:r>
+          </a:p>
+        </p:txBody>
+      </p:sp>
+      <p:sp>
+        <p:nvSpPr>
+          <p:cNvPr id="6" name="Link">
+            <a:extLst>
+              <a:ext uri="{FF2B5EF4-FFF2-40B4-BE49-F238E27FC236}">
+                <a16:creationId xmlns:a16="http://schemas.microsoft.com/office/drawing/2014/main" id="{C81CCF5C-9457-44D5-A413-8BA65061754C}"/>
+              </a:ext>
+            </a:extLst>
+          </p:cNvPr>
+          <p:cNvSpPr txBox="1"/>
+          <p:nvPr/>
+        </p:nvSpPr>
+        <p:spPr>
+          <a:xfrm>
+            <a:off x="9454538" y="6696999"/>
+            <a:ext cx="2737462" cy="161001"/>
+          </a:xfrm>
+          <a:prstGeom prst="rect">
+            <a:avLst/>
+          </a:prstGeom>
+          <a:noFill/>
+        </p:spPr>
+        <p:txBody>
+          <a:bodyPr wrap="none" lIns="72000" tIns="0" rIns="72000" bIns="36000" rtlCol="0">
+            <a:spAutoFit/>
+          </a:bodyPr>
+          <a:lstStyle/>
+          <a:p>
+            <a:pPr>
+              <a:lnSpc>
+                <a:spcPct val="90000"/>
+              </a:lnSpc>
+              <a:spcAft>
+                <a:spcPts val="600"/>
+              </a:spcAft>
+            </a:pPr>
+            <a:r>
+              <a:rPr lang="en-AU" sz="900" dirty="0">
+                <a:solidFill>
+                  <a:schemeClr val="bg1">
+                    <a:lumMod val="50000"/>
+                  </a:schemeClr>
+                </a:solidFill>
+              </a:rPr>
+              <a:t>Latest diagrams available here: </a:t>
+            </a:r>
+            <a:r>
+              <a:rPr lang="en-AU" sz="900" dirty="0">
+                <a:solidFill>
+                  <a:schemeClr val="bg1">
+                    <a:lumMod val="50000"/>
+                  </a:schemeClr>
+                </a:solidFill>
+                <a:hlinkClick r:id="rId2"/>
+              </a:rPr>
+              <a:t>https://m365maps.com</a:t>
+            </a:r>
+            <a:endParaRPr lang="en-AU" sz="900" dirty="0">
+              <a:solidFill>
+                <a:schemeClr val="bg1">
+                  <a:lumMod val="50000"/>
+                </a:schemeClr>
+              </a:solidFill>
+            </a:endParaRPr>
+          </a:p>
+        </p:txBody>
+      </p:sp>
+      <p:pic>
+        <p:nvPicPr>
+          <p:cNvPr id="8" name="Picture 7">
+            <a:extLst>
+              <a:ext uri="{FF2B5EF4-FFF2-40B4-BE49-F238E27FC236}">
+                <a16:creationId xmlns:a16="http://schemas.microsoft.com/office/drawing/2014/main" id="{A58BC5A9-6BDB-4DC8-A8BF-463CB8CB4C04}"/>
+              </a:ext>
+            </a:extLst>
+          </p:cNvPr>
+          <p:cNvPicPr>
+            <a:picLocks noChangeAspect="1"/>
+          </p:cNvPicPr>
+          <p:nvPr/>
+        </p:nvPicPr>
+        <p:blipFill>
+          <a:blip r:embed="rId3"/>
+          <a:stretch>
+            <a:fillRect/>
+          </a:stretch>
+        </p:blipFill>
+        <p:spPr>
+          <a:xfrm>
+            <a:off x="230487" y="2557938"/>
+            <a:ext cx="11731028" cy="3268151"/>
+          </a:xfrm>
+          <a:prstGeom prst="rect">
+            <a:avLst/>
+          </a:prstGeom>
+        </p:spPr>
+      </p:pic>
+    </p:spTree>
+    <p:extLst>
+      <p:ext uri="{BB962C8B-B14F-4D97-AF65-F5344CB8AC3E}">
+        <p14:creationId xmlns:p14="http://schemas.microsoft.com/office/powerpoint/2010/main" val="2245115415"/>
+      </p:ext>
+    </p:extLst>
+  </p:cSld>
+  <p:clrMapOvr>
+    <a:masterClrMapping/>
+  </p:clrMapOvr>
+  <mc:AlternateContent xmlns:mc="http://schemas.openxmlformats.org/markup-compatibility/2006" xmlns:p14="http://schemas.microsoft.com/office/powerpoint/2010/main">
+    <mc:Choice Requires="p14">
+      <p:transition spd="med" p14:dur="700">
+        <p:fade/>
+      </p:transition>
+    </mc:Choice>
+    <mc:Fallback xmlns="">
+      <p:transition spd="med">
+        <p:fade/>
+      </p:transition>
+    </mc:Fallback>
+  </mc:AlternateContent>
+</p:sld>
+</file>
+
+<file path=ppt/slides/slide8.xml><?xml version="1.0" encoding="utf-8"?>
+<p:sld xmlns:a="http://schemas.openxmlformats.org/drawingml/2006/main" xmlns:r="http://schemas.openxmlformats.org/officeDocument/2006/relationships" xmlns:p="http://schemas.openxmlformats.org/presentationml/2006/main">
+  <p:cSld>
+    <p:spTree>
+      <p:nvGrpSpPr>
+        <p:cNvPr id="1" name=""/>
+        <p:cNvGrpSpPr/>
+        <p:nvPr/>
+      </p:nvGrpSpPr>
+      <p:grpSpPr>
+        <a:xfrm>
+          <a:off x="0" y="0"/>
+          <a:ext cx="0" cy="0"/>
+          <a:chOff x="0" y="0"/>
+          <a:chExt cx="0" cy="0"/>
+        </a:xfrm>
+      </p:grpSpPr>
+      <p:sp>
+        <p:nvSpPr>
+          <p:cNvPr id="4" name="Title 3">
+            <a:extLst>
+              <a:ext uri="{FF2B5EF4-FFF2-40B4-BE49-F238E27FC236}">
+                <a16:creationId xmlns:a16="http://schemas.microsoft.com/office/drawing/2014/main" id="{E725C983-1262-45C1-97B6-EA1476569104}"/>
+              </a:ext>
+            </a:extLst>
+          </p:cNvPr>
+          <p:cNvSpPr>
+            <a:spLocks noGrp="1"/>
+          </p:cNvSpPr>
+          <p:nvPr>
+            <p:ph type="title"/>
+          </p:nvPr>
+        </p:nvSpPr>
+        <p:spPr>
+          <a:xfrm>
+            <a:off x="831850" y="0"/>
+            <a:ext cx="10515600" cy="6857999"/>
+          </a:xfrm>
+        </p:spPr>
+        <p:txBody>
+          <a:bodyPr anchor="ctr">
+            <a:normAutofit/>
+          </a:bodyPr>
+          <a:lstStyle/>
+          <a:p>
+            <a:r>
+              <a:rPr lang="en-AU" dirty="0"/>
+              <a:t>Website</a:t>
+            </a:r>
+            <a:br>
+              <a:rPr lang="en-AU" dirty="0"/>
+            </a:br>
+            <a:r>
+              <a:rPr lang="en-AU" sz="4000" dirty="0">
+                <a:hlinkClick r:id="rId2"/>
+              </a:rPr>
+              <a:t>https://m365maps.com</a:t>
+            </a:r>
+            <a:br>
+              <a:rPr lang="en-AU" dirty="0"/>
+            </a:br>
+            <a:br>
+              <a:rPr lang="en-AU" dirty="0"/>
+            </a:br>
+            <a:r>
+              <a:rPr lang="en-AU" dirty="0"/>
+              <a:t>GitHub</a:t>
             </a:r>
             <a:br>
               <a:rPr lang="en-AU" dirty="0"/>
@@ -5327,7 +5318,7 @@
                     <a:lumMod val="50000"/>
                   </a:schemeClr>
                 </a:solidFill>
-                <a:hlinkClick r:id="rId2">
+                <a:hlinkClick r:id="rId3">
                   <a:extLst>
                     <a:ext uri="{A12FA001-AC4F-418D-AE19-62706E023703}">
                       <ahyp:hlinkClr xmlns:ahyp="http://schemas.microsoft.com/office/drawing/2018/hyperlinkcolor" val="tx"/>
@@ -5358,7 +5349,7 @@
             </a:br>
             <a:r>
               <a:rPr lang="en-AU" sz="4000" dirty="0">
-                <a:hlinkClick r:id="rId3"/>
+                <a:hlinkClick r:id="rId4"/>
               </a:rPr>
               <a:t>https://twitter.com/AaronDinnage</a:t>
             </a:r>
@@ -5367,7 +5358,7 @@
             </a:br>
             <a:r>
               <a:rPr lang="en-AU" sz="4000" dirty="0">
-                <a:hlinkClick r:id="rId4"/>
+                <a:hlinkClick r:id="rId5"/>
               </a:rPr>
               <a:t>https://www.linkedin.com/in/aarondinnage/</a:t>
             </a:r>

</xml_diff>

<commit_message>
March 2021 - Release
Minor updates across all diagrams.
New diagrams:  Microsoft 365 Apps, Microsoft 365 Consumer, and Microsoft Teams Rooms.
Major update to m365maps.com
Please see the change log and user guide on m365maps.com for more information.
</commit_message>
<xml_diff>
--- a/Microsoft 365 Enterprise License Map.pptx
+++ b/Microsoft 365 Enterprise License Map.pptx
@@ -141,7 +141,7 @@
 <file path=ppt/revisionInfo.xml><?xml version="1.0" encoding="utf-8"?>
 <p1510:revInfo xmlns:a="http://schemas.openxmlformats.org/drawingml/2006/main" xmlns:r="http://schemas.openxmlformats.org/officeDocument/2006/relationships" xmlns:p1510="http://schemas.microsoft.com/office/powerpoint/2015/10/main">
   <p1510:revLst>
-    <p1510:client id="{511945EA-59AD-490D-A736-3EA0D68DB087}" v="24" dt="2021-02-08T13:36:24.395"/>
+    <p1510:client id="{E064CA59-0E21-4C53-928A-7E9DC8C086EA}" v="6" dt="2021-03-26T11:21:57.368"/>
   </p1510:revLst>
 </p1510:revInfo>
 </file>
@@ -228,7 +228,7 @@
           <a:p>
             <a:fld id="{5501C88C-2D47-4607-965A-262E2CFCF213}" type="datetimeFigureOut">
               <a:rPr lang="en-AU" smtClean="0"/>
-              <a:t>9/02/2021</a:t>
+              <a:t>26/03/2021</a:t>
             </a:fld>
             <a:endParaRPr lang="en-AU"/>
           </a:p>
@@ -1082,7 +1082,7 @@
           <a:p>
             <a:fld id="{5A8F0079-C155-4963-BA90-8B06FFA7587C}" type="datetimeFigureOut">
               <a:rPr lang="en-AU" smtClean="0"/>
-              <a:t>9/02/2021</a:t>
+              <a:t>26/03/2021</a:t>
             </a:fld>
             <a:endParaRPr lang="en-AU"/>
           </a:p>
@@ -1282,7 +1282,7 @@
           <a:p>
             <a:fld id="{5A8F0079-C155-4963-BA90-8B06FFA7587C}" type="datetimeFigureOut">
               <a:rPr lang="en-AU" smtClean="0"/>
-              <a:t>9/02/2021</a:t>
+              <a:t>26/03/2021</a:t>
             </a:fld>
             <a:endParaRPr lang="en-AU"/>
           </a:p>
@@ -1492,7 +1492,7 @@
           <a:p>
             <a:fld id="{5A8F0079-C155-4963-BA90-8B06FFA7587C}" type="datetimeFigureOut">
               <a:rPr lang="en-AU" smtClean="0"/>
-              <a:t>9/02/2021</a:t>
+              <a:t>26/03/2021</a:t>
             </a:fld>
             <a:endParaRPr lang="en-AU"/>
           </a:p>
@@ -1692,7 +1692,7 @@
           <a:p>
             <a:fld id="{5A8F0079-C155-4963-BA90-8B06FFA7587C}" type="datetimeFigureOut">
               <a:rPr lang="en-AU" smtClean="0"/>
-              <a:t>9/02/2021</a:t>
+              <a:t>26/03/2021</a:t>
             </a:fld>
             <a:endParaRPr lang="en-AU"/>
           </a:p>
@@ -1968,7 +1968,7 @@
           <a:p>
             <a:fld id="{5A8F0079-C155-4963-BA90-8B06FFA7587C}" type="datetimeFigureOut">
               <a:rPr lang="en-AU" smtClean="0"/>
-              <a:t>9/02/2021</a:t>
+              <a:t>26/03/2021</a:t>
             </a:fld>
             <a:endParaRPr lang="en-AU"/>
           </a:p>
@@ -2236,7 +2236,7 @@
           <a:p>
             <a:fld id="{5A8F0079-C155-4963-BA90-8B06FFA7587C}" type="datetimeFigureOut">
               <a:rPr lang="en-AU" smtClean="0"/>
-              <a:t>9/02/2021</a:t>
+              <a:t>26/03/2021</a:t>
             </a:fld>
             <a:endParaRPr lang="en-AU"/>
           </a:p>
@@ -2651,7 +2651,7 @@
           <a:p>
             <a:fld id="{5A8F0079-C155-4963-BA90-8B06FFA7587C}" type="datetimeFigureOut">
               <a:rPr lang="en-AU" smtClean="0"/>
-              <a:t>9/02/2021</a:t>
+              <a:t>26/03/2021</a:t>
             </a:fld>
             <a:endParaRPr lang="en-AU"/>
           </a:p>
@@ -2793,7 +2793,7 @@
           <a:p>
             <a:fld id="{5A8F0079-C155-4963-BA90-8B06FFA7587C}" type="datetimeFigureOut">
               <a:rPr lang="en-AU" smtClean="0"/>
-              <a:t>9/02/2021</a:t>
+              <a:t>26/03/2021</a:t>
             </a:fld>
             <a:endParaRPr lang="en-AU"/>
           </a:p>
@@ -2906,7 +2906,7 @@
           <a:p>
             <a:fld id="{5A8F0079-C155-4963-BA90-8B06FFA7587C}" type="datetimeFigureOut">
               <a:rPr lang="en-AU" smtClean="0"/>
-              <a:t>9/02/2021</a:t>
+              <a:t>26/03/2021</a:t>
             </a:fld>
             <a:endParaRPr lang="en-AU"/>
           </a:p>
@@ -3219,7 +3219,7 @@
           <a:p>
             <a:fld id="{5A8F0079-C155-4963-BA90-8B06FFA7587C}" type="datetimeFigureOut">
               <a:rPr lang="en-AU" smtClean="0"/>
-              <a:t>9/02/2021</a:t>
+              <a:t>26/03/2021</a:t>
             </a:fld>
             <a:endParaRPr lang="en-AU"/>
           </a:p>
@@ -3508,7 +3508,7 @@
           <a:p>
             <a:fld id="{5A8F0079-C155-4963-BA90-8B06FFA7587C}" type="datetimeFigureOut">
               <a:rPr lang="en-AU" smtClean="0"/>
-              <a:t>9/02/2021</a:t>
+              <a:t>26/03/2021</a:t>
             </a:fld>
             <a:endParaRPr lang="en-AU"/>
           </a:p>
@@ -3751,7 +3751,7 @@
           <a:p>
             <a:fld id="{5A8F0079-C155-4963-BA90-8B06FFA7587C}" type="datetimeFigureOut">
               <a:rPr lang="en-AU" smtClean="0"/>
-              <a:t>9/02/2021</a:t>
+              <a:t>26/03/2021</a:t>
             </a:fld>
             <a:endParaRPr lang="en-AU"/>
           </a:p>
@@ -4232,7 +4232,7 @@
           <a:p>
             <a:r>
               <a:rPr lang="en-AU" dirty="0"/>
-              <a:t>February 2021</a:t>
+              <a:t>March 2021</a:t>
             </a:r>
           </a:p>
         </p:txBody>
@@ -4356,6 +4356,41 @@
           <a:chExt cx="0" cy="0"/>
         </a:xfrm>
       </p:grpSpPr>
+      <p:pic>
+        <p:nvPicPr>
+          <p:cNvPr id="4" name="Picture 3" descr="Table&#10;&#10;Description automatically generated">
+            <a:extLst>
+              <a:ext uri="{FF2B5EF4-FFF2-40B4-BE49-F238E27FC236}">
+                <a16:creationId xmlns:a16="http://schemas.microsoft.com/office/drawing/2014/main" id="{1215E541-9C2A-4960-986C-728DC251CDE4}"/>
+              </a:ext>
+            </a:extLst>
+          </p:cNvPr>
+          <p:cNvPicPr>
+            <a:picLocks noChangeAspect="1"/>
+          </p:cNvPicPr>
+          <p:nvPr/>
+        </p:nvPicPr>
+        <p:blipFill rotWithShape="1">
+          <a:blip r:embed="rId3">
+            <a:extLst>
+              <a:ext uri="{28A0092B-C50C-407E-A947-70E740481C1C}">
+                <a14:useLocalDpi xmlns:a14="http://schemas.microsoft.com/office/drawing/2010/main" val="0"/>
+              </a:ext>
+            </a:extLst>
+          </a:blip>
+          <a:srcRect t="15320"/>
+          <a:stretch/>
+        </p:blipFill>
+        <p:spPr>
+          <a:xfrm>
+            <a:off x="0" y="594271"/>
+            <a:ext cx="12192000" cy="5669457"/>
+          </a:xfrm>
+          <a:prstGeom prst="rect">
+            <a:avLst/>
+          </a:prstGeom>
+        </p:spPr>
+      </p:pic>
       <p:sp>
         <p:nvSpPr>
           <p:cNvPr id="2" name="Link">
@@ -4409,7 +4444,7 @@
                     <a:lumMod val="50000"/>
                   </a:schemeClr>
                 </a:solidFill>
-                <a:hlinkClick r:id="rId3"/>
+                <a:hlinkClick r:id="rId4"/>
               </a:rPr>
               <a:t>https://m365maps.com</a:t>
             </a:r>
@@ -4423,41 +4458,6 @@
           </a:p>
         </p:txBody>
       </p:sp>
-      <p:pic>
-        <p:nvPicPr>
-          <p:cNvPr id="5" name="Picture 4" descr="A screenshot of a computer&#10;&#10;Description automatically generated with low confidence">
-            <a:extLst>
-              <a:ext uri="{FF2B5EF4-FFF2-40B4-BE49-F238E27FC236}">
-                <a16:creationId xmlns:a16="http://schemas.microsoft.com/office/drawing/2014/main" id="{C57C1291-ECCC-4569-94CE-E50FFE5E4346}"/>
-              </a:ext>
-            </a:extLst>
-          </p:cNvPr>
-          <p:cNvPicPr>
-            <a:picLocks noChangeAspect="1"/>
-          </p:cNvPicPr>
-          <p:nvPr/>
-        </p:nvPicPr>
-        <p:blipFill rotWithShape="1">
-          <a:blip r:embed="rId4">
-            <a:extLst>
-              <a:ext uri="{28A0092B-C50C-407E-A947-70E740481C1C}">
-                <a14:useLocalDpi xmlns:a14="http://schemas.microsoft.com/office/drawing/2010/main" val="0"/>
-              </a:ext>
-            </a:extLst>
-          </a:blip>
-          <a:srcRect t="15738"/>
-          <a:stretch/>
-        </p:blipFill>
-        <p:spPr>
-          <a:xfrm>
-            <a:off x="0" y="594272"/>
-            <a:ext cx="12192000" cy="5669457"/>
-          </a:xfrm>
-          <a:prstGeom prst="rect">
-            <a:avLst/>
-          </a:prstGeom>
-        </p:spPr>
-      </p:pic>
     </p:spTree>
     <p:extLst>
       <p:ext uri="{BB962C8B-B14F-4D97-AF65-F5344CB8AC3E}">
@@ -4500,6 +4500,41 @@
           <a:chExt cx="0" cy="0"/>
         </a:xfrm>
       </p:grpSpPr>
+      <p:pic>
+        <p:nvPicPr>
+          <p:cNvPr id="3" name="Picture 2" descr="Table&#10;&#10;Description automatically generated">
+            <a:extLst>
+              <a:ext uri="{FF2B5EF4-FFF2-40B4-BE49-F238E27FC236}">
+                <a16:creationId xmlns:a16="http://schemas.microsoft.com/office/drawing/2014/main" id="{9F712E88-E44A-4B2B-A02A-C12D6242B3F4}"/>
+              </a:ext>
+            </a:extLst>
+          </p:cNvPr>
+          <p:cNvPicPr>
+            <a:picLocks noChangeAspect="1"/>
+          </p:cNvPicPr>
+          <p:nvPr/>
+        </p:nvPicPr>
+        <p:blipFill rotWithShape="1">
+          <a:blip r:embed="rId3">
+            <a:extLst>
+              <a:ext uri="{28A0092B-C50C-407E-A947-70E740481C1C}">
+                <a14:useLocalDpi xmlns:a14="http://schemas.microsoft.com/office/drawing/2010/main" val="0"/>
+              </a:ext>
+            </a:extLst>
+          </a:blip>
+          <a:srcRect t="11272"/>
+          <a:stretch/>
+        </p:blipFill>
+        <p:spPr>
+          <a:xfrm>
+            <a:off x="0" y="0"/>
+            <a:ext cx="12232553" cy="6654898"/>
+          </a:xfrm>
+          <a:prstGeom prst="rect">
+            <a:avLst/>
+          </a:prstGeom>
+        </p:spPr>
+      </p:pic>
       <p:sp>
         <p:nvSpPr>
           <p:cNvPr id="4" name="Link">
@@ -4553,7 +4588,7 @@
                     <a:lumMod val="50000"/>
                   </a:schemeClr>
                 </a:solidFill>
-                <a:hlinkClick r:id="rId3"/>
+                <a:hlinkClick r:id="rId4"/>
               </a:rPr>
               <a:t>https://m365maps.com</a:t>
             </a:r>
@@ -4567,41 +4602,6 @@
           </a:p>
         </p:txBody>
       </p:sp>
-      <p:pic>
-        <p:nvPicPr>
-          <p:cNvPr id="5" name="Picture 4" descr="Table, calendar&#10;&#10;Description automatically generated">
-            <a:extLst>
-              <a:ext uri="{FF2B5EF4-FFF2-40B4-BE49-F238E27FC236}">
-                <a16:creationId xmlns:a16="http://schemas.microsoft.com/office/drawing/2014/main" id="{7816A5A4-E82A-4D53-870C-573F5553B8A4}"/>
-              </a:ext>
-            </a:extLst>
-          </p:cNvPr>
-          <p:cNvPicPr>
-            <a:picLocks noChangeAspect="1"/>
-          </p:cNvPicPr>
-          <p:nvPr/>
-        </p:nvPicPr>
-        <p:blipFill rotWithShape="1">
-          <a:blip r:embed="rId4">
-            <a:extLst>
-              <a:ext uri="{28A0092B-C50C-407E-A947-70E740481C1C}">
-                <a14:useLocalDpi xmlns:a14="http://schemas.microsoft.com/office/drawing/2010/main" val="0"/>
-              </a:ext>
-            </a:extLst>
-          </a:blip>
-          <a:srcRect t="11899"/>
-          <a:stretch/>
-        </p:blipFill>
-        <p:spPr>
-          <a:xfrm>
-            <a:off x="0" y="39328"/>
-            <a:ext cx="12192000" cy="6611977"/>
-          </a:xfrm>
-          <a:prstGeom prst="rect">
-            <a:avLst/>
-          </a:prstGeom>
-        </p:spPr>
-      </p:pic>
     </p:spTree>
     <p:extLst>
       <p:ext uri="{BB962C8B-B14F-4D97-AF65-F5344CB8AC3E}">
@@ -4644,6 +4644,41 @@
           <a:chExt cx="0" cy="0"/>
         </a:xfrm>
       </p:grpSpPr>
+      <p:pic>
+        <p:nvPicPr>
+          <p:cNvPr id="3" name="Picture 2" descr="Graphical user interface, table&#10;&#10;Description automatically generated">
+            <a:extLst>
+              <a:ext uri="{FF2B5EF4-FFF2-40B4-BE49-F238E27FC236}">
+                <a16:creationId xmlns:a16="http://schemas.microsoft.com/office/drawing/2014/main" id="{AE6F4619-8EA8-4AB9-9243-2669153E9776}"/>
+              </a:ext>
+            </a:extLst>
+          </p:cNvPr>
+          <p:cNvPicPr>
+            <a:picLocks noChangeAspect="1"/>
+          </p:cNvPicPr>
+          <p:nvPr/>
+        </p:nvPicPr>
+        <p:blipFill rotWithShape="1">
+          <a:blip r:embed="rId3">
+            <a:extLst>
+              <a:ext uri="{28A0092B-C50C-407E-A947-70E740481C1C}">
+                <a14:useLocalDpi xmlns:a14="http://schemas.microsoft.com/office/drawing/2010/main" val="0"/>
+              </a:ext>
+            </a:extLst>
+          </a:blip>
+          <a:srcRect t="15487"/>
+          <a:stretch/>
+        </p:blipFill>
+        <p:spPr>
+          <a:xfrm>
+            <a:off x="0" y="331043"/>
+            <a:ext cx="12192000" cy="6195913"/>
+          </a:xfrm>
+          <a:prstGeom prst="rect">
+            <a:avLst/>
+          </a:prstGeom>
+        </p:spPr>
+      </p:pic>
       <p:sp>
         <p:nvSpPr>
           <p:cNvPr id="4" name="Link">
@@ -4697,7 +4732,7 @@
                     <a:lumMod val="50000"/>
                   </a:schemeClr>
                 </a:solidFill>
-                <a:hlinkClick r:id="rId3"/>
+                <a:hlinkClick r:id="rId4"/>
               </a:rPr>
               <a:t>https://m365maps.com</a:t>
             </a:r>
@@ -4711,41 +4746,6 @@
           </a:p>
         </p:txBody>
       </p:sp>
-      <p:pic>
-        <p:nvPicPr>
-          <p:cNvPr id="5" name="Picture 4" descr="Graphical user interface&#10;&#10;Description automatically generated with medium confidence">
-            <a:extLst>
-              <a:ext uri="{FF2B5EF4-FFF2-40B4-BE49-F238E27FC236}">
-                <a16:creationId xmlns:a16="http://schemas.microsoft.com/office/drawing/2014/main" id="{0846A18D-C0F8-4FB3-BA3A-E504364BB6AE}"/>
-              </a:ext>
-            </a:extLst>
-          </p:cNvPr>
-          <p:cNvPicPr>
-            <a:picLocks noChangeAspect="1"/>
-          </p:cNvPicPr>
-          <p:nvPr/>
-        </p:nvPicPr>
-        <p:blipFill rotWithShape="1">
-          <a:blip r:embed="rId4">
-            <a:extLst>
-              <a:ext uri="{28A0092B-C50C-407E-A947-70E740481C1C}">
-                <a14:useLocalDpi xmlns:a14="http://schemas.microsoft.com/office/drawing/2010/main" val="0"/>
-              </a:ext>
-            </a:extLst>
-          </a:blip>
-          <a:srcRect t="15914"/>
-          <a:stretch/>
-        </p:blipFill>
-        <p:spPr>
-          <a:xfrm>
-            <a:off x="0" y="331044"/>
-            <a:ext cx="12192000" cy="6195913"/>
-          </a:xfrm>
-          <a:prstGeom prst="rect">
-            <a:avLst/>
-          </a:prstGeom>
-        </p:spPr>
-      </p:pic>
     </p:spTree>
     <p:extLst>
       <p:ext uri="{BB962C8B-B14F-4D97-AF65-F5344CB8AC3E}">
@@ -4788,6 +4788,41 @@
           <a:chExt cx="0" cy="0"/>
         </a:xfrm>
       </p:grpSpPr>
+      <p:pic>
+        <p:nvPicPr>
+          <p:cNvPr id="3" name="Picture 2" descr="Graphical user interface, table&#10;&#10;Description automatically generated">
+            <a:extLst>
+              <a:ext uri="{FF2B5EF4-FFF2-40B4-BE49-F238E27FC236}">
+                <a16:creationId xmlns:a16="http://schemas.microsoft.com/office/drawing/2014/main" id="{6F8EF350-0DFD-4976-AE15-376DF758A25D}"/>
+              </a:ext>
+            </a:extLst>
+          </p:cNvPr>
+          <p:cNvPicPr>
+            <a:picLocks noChangeAspect="1"/>
+          </p:cNvPicPr>
+          <p:nvPr/>
+        </p:nvPicPr>
+        <p:blipFill rotWithShape="1">
+          <a:blip r:embed="rId3">
+            <a:extLst>
+              <a:ext uri="{28A0092B-C50C-407E-A947-70E740481C1C}">
+                <a14:useLocalDpi xmlns:a14="http://schemas.microsoft.com/office/drawing/2010/main" val="0"/>
+              </a:ext>
+            </a:extLst>
+          </a:blip>
+          <a:srcRect t="14226"/>
+          <a:stretch/>
+        </p:blipFill>
+        <p:spPr>
+          <a:xfrm>
+            <a:off x="0" y="487811"/>
+            <a:ext cx="12192000" cy="5910793"/>
+          </a:xfrm>
+          <a:prstGeom prst="rect">
+            <a:avLst/>
+          </a:prstGeom>
+        </p:spPr>
+      </p:pic>
       <p:sp>
         <p:nvSpPr>
           <p:cNvPr id="4" name="Link">
@@ -4841,7 +4876,7 @@
                     <a:lumMod val="50000"/>
                   </a:schemeClr>
                 </a:solidFill>
-                <a:hlinkClick r:id="rId3"/>
+                <a:hlinkClick r:id="rId4"/>
               </a:rPr>
               <a:t>https://m365maps.com</a:t>
             </a:r>
@@ -4855,41 +4890,6 @@
           </a:p>
         </p:txBody>
       </p:sp>
-      <p:pic>
-        <p:nvPicPr>
-          <p:cNvPr id="5" name="Picture 4" descr="Graphical user interface, table&#10;&#10;Description automatically generated">
-            <a:extLst>
-              <a:ext uri="{FF2B5EF4-FFF2-40B4-BE49-F238E27FC236}">
-                <a16:creationId xmlns:a16="http://schemas.microsoft.com/office/drawing/2014/main" id="{C4F8768C-DE3E-4EC6-BE8E-DEB2EB7198B0}"/>
-              </a:ext>
-            </a:extLst>
-          </p:cNvPr>
-          <p:cNvPicPr>
-            <a:picLocks noChangeAspect="1"/>
-          </p:cNvPicPr>
-          <p:nvPr/>
-        </p:nvPicPr>
-        <p:blipFill rotWithShape="1">
-          <a:blip r:embed="rId4">
-            <a:extLst>
-              <a:ext uri="{28A0092B-C50C-407E-A947-70E740481C1C}">
-                <a14:useLocalDpi xmlns:a14="http://schemas.microsoft.com/office/drawing/2010/main" val="0"/>
-              </a:ext>
-            </a:extLst>
-          </a:blip>
-          <a:srcRect t="15112"/>
-          <a:stretch/>
-        </p:blipFill>
-        <p:spPr>
-          <a:xfrm>
-            <a:off x="0" y="487812"/>
-            <a:ext cx="12191999" cy="5882376"/>
-          </a:xfrm>
-          <a:prstGeom prst="rect">
-            <a:avLst/>
-          </a:prstGeom>
-        </p:spPr>
-      </p:pic>
     </p:spTree>
     <p:extLst>
       <p:ext uri="{BB962C8B-B14F-4D97-AF65-F5344CB8AC3E}">
@@ -4932,79 +4932,12 @@
           <a:chExt cx="0" cy="0"/>
         </a:xfrm>
       </p:grpSpPr>
-      <p:sp>
-        <p:nvSpPr>
-          <p:cNvPr id="4" name="Link">
-            <a:extLst>
-              <a:ext uri="{FF2B5EF4-FFF2-40B4-BE49-F238E27FC236}">
-                <a16:creationId xmlns:a16="http://schemas.microsoft.com/office/drawing/2014/main" id="{1DE1EA15-0E87-4788-9ECA-83284C573D5E}"/>
-              </a:ext>
-            </a:extLst>
-          </p:cNvPr>
-          <p:cNvSpPr txBox="1"/>
-          <p:nvPr/>
-        </p:nvSpPr>
-        <p:spPr>
-          <a:xfrm>
-            <a:off x="9454538" y="6696999"/>
-            <a:ext cx="2737462" cy="161001"/>
-          </a:xfrm>
-          <a:prstGeom prst="rect">
-            <a:avLst/>
-          </a:prstGeom>
-          <a:noFill/>
-        </p:spPr>
-        <p:txBody>
-          <a:bodyPr wrap="none" lIns="72000" tIns="0" rIns="72000" bIns="36000" rtlCol="0">
-            <a:spAutoFit/>
-          </a:bodyPr>
-          <a:lstStyle/>
-          <a:p>
-            <a:pPr>
-              <a:lnSpc>
-                <a:spcPct val="90000"/>
-              </a:lnSpc>
-              <a:spcAft>
-                <a:spcPts val="600"/>
-              </a:spcAft>
-            </a:pPr>
-            <a:r>
-              <a:rPr lang="en-AU" sz="900" dirty="0">
-                <a:solidFill>
-                  <a:schemeClr val="bg1">
-                    <a:lumMod val="50000"/>
-                  </a:schemeClr>
-                </a:solidFill>
-              </a:rPr>
-              <a:t>Latest diagrams available here: </a:t>
-            </a:r>
-            <a:r>
-              <a:rPr lang="en-AU" sz="900" dirty="0">
-                <a:solidFill>
-                  <a:schemeClr val="bg1">
-                    <a:lumMod val="50000"/>
-                  </a:schemeClr>
-                </a:solidFill>
-                <a:hlinkClick r:id="rId3"/>
-              </a:rPr>
-              <a:t>https://m365maps.com</a:t>
-            </a:r>
-            <a:endParaRPr lang="en-AU" sz="900" dirty="0">
-              <a:solidFill>
-                <a:schemeClr val="bg1">
-                  <a:lumMod val="50000"/>
-                </a:schemeClr>
-              </a:solidFill>
-            </a:endParaRPr>
-          </a:p>
-        </p:txBody>
-      </p:sp>
       <p:pic>
         <p:nvPicPr>
-          <p:cNvPr id="5" name="Picture 4" descr="Table, calendar&#10;&#10;Description automatically generated">
-            <a:extLst>
-              <a:ext uri="{FF2B5EF4-FFF2-40B4-BE49-F238E27FC236}">
-                <a16:creationId xmlns:a16="http://schemas.microsoft.com/office/drawing/2014/main" id="{BA39DA5F-A5D8-4B75-9B67-8F8D925F80C1}"/>
+          <p:cNvPr id="3" name="Picture 2" descr="Table&#10;&#10;Description automatically generated">
+            <a:extLst>
+              <a:ext uri="{FF2B5EF4-FFF2-40B4-BE49-F238E27FC236}">
+                <a16:creationId xmlns:a16="http://schemas.microsoft.com/office/drawing/2014/main" id="{1675E933-E673-4440-A109-084D0A1E32DE}"/>
               </a:ext>
             </a:extLst>
           </p:cNvPr>
@@ -5014,14 +4947,14 @@
           <p:nvPr/>
         </p:nvPicPr>
         <p:blipFill rotWithShape="1">
-          <a:blip r:embed="rId4">
+          <a:blip r:embed="rId3">
             <a:extLst>
               <a:ext uri="{28A0092B-C50C-407E-A947-70E740481C1C}">
                 <a14:useLocalDpi xmlns:a14="http://schemas.microsoft.com/office/drawing/2010/main" val="0"/>
               </a:ext>
             </a:extLst>
           </a:blip>
-          <a:srcRect t="13296"/>
+          <a:srcRect t="12895"/>
           <a:stretch/>
         </p:blipFill>
         <p:spPr>
@@ -5034,6 +4967,73 @@
           </a:prstGeom>
         </p:spPr>
       </p:pic>
+      <p:sp>
+        <p:nvSpPr>
+          <p:cNvPr id="4" name="Link">
+            <a:extLst>
+              <a:ext uri="{FF2B5EF4-FFF2-40B4-BE49-F238E27FC236}">
+                <a16:creationId xmlns:a16="http://schemas.microsoft.com/office/drawing/2014/main" id="{1DE1EA15-0E87-4788-9ECA-83284C573D5E}"/>
+              </a:ext>
+            </a:extLst>
+          </p:cNvPr>
+          <p:cNvSpPr txBox="1"/>
+          <p:nvPr/>
+        </p:nvSpPr>
+        <p:spPr>
+          <a:xfrm>
+            <a:off x="9454538" y="6696999"/>
+            <a:ext cx="2737462" cy="161001"/>
+          </a:xfrm>
+          <a:prstGeom prst="rect">
+            <a:avLst/>
+          </a:prstGeom>
+          <a:noFill/>
+        </p:spPr>
+        <p:txBody>
+          <a:bodyPr wrap="none" lIns="72000" tIns="0" rIns="72000" bIns="36000" rtlCol="0">
+            <a:spAutoFit/>
+          </a:bodyPr>
+          <a:lstStyle/>
+          <a:p>
+            <a:pPr>
+              <a:lnSpc>
+                <a:spcPct val="90000"/>
+              </a:lnSpc>
+              <a:spcAft>
+                <a:spcPts val="600"/>
+              </a:spcAft>
+            </a:pPr>
+            <a:r>
+              <a:rPr lang="en-AU" sz="900" dirty="0">
+                <a:solidFill>
+                  <a:schemeClr val="bg1">
+                    <a:lumMod val="50000"/>
+                  </a:schemeClr>
+                </a:solidFill>
+              </a:rPr>
+              <a:t>Latest diagrams available here: </a:t>
+            </a:r>
+            <a:r>
+              <a:rPr lang="en-AU" sz="900" dirty="0">
+                <a:solidFill>
+                  <a:schemeClr val="bg1">
+                    <a:lumMod val="50000"/>
+                  </a:schemeClr>
+                </a:solidFill>
+                <a:hlinkClick r:id="rId4"/>
+              </a:rPr>
+              <a:t>https://m365maps.com</a:t>
+            </a:r>
+            <a:endParaRPr lang="en-AU" sz="900" dirty="0">
+              <a:solidFill>
+                <a:schemeClr val="bg1">
+                  <a:lumMod val="50000"/>
+                </a:schemeClr>
+              </a:solidFill>
+            </a:endParaRPr>
+          </a:p>
+        </p:txBody>
+      </p:sp>
     </p:spTree>
     <p:extLst>
       <p:ext uri="{BB962C8B-B14F-4D97-AF65-F5344CB8AC3E}">
@@ -5187,10 +5187,10 @@
       </p:sp>
       <p:pic>
         <p:nvPicPr>
-          <p:cNvPr id="8" name="Picture 7">
-            <a:extLst>
-              <a:ext uri="{FF2B5EF4-FFF2-40B4-BE49-F238E27FC236}">
-                <a16:creationId xmlns:a16="http://schemas.microsoft.com/office/drawing/2014/main" id="{A58BC5A9-6BDB-4DC8-A8BF-463CB8CB4C04}"/>
+          <p:cNvPr id="7" name="Picture 6">
+            <a:extLst>
+              <a:ext uri="{FF2B5EF4-FFF2-40B4-BE49-F238E27FC236}">
+                <a16:creationId xmlns:a16="http://schemas.microsoft.com/office/drawing/2014/main" id="{2EF6631B-9E41-4587-B8B1-FFDB40EA938D}"/>
               </a:ext>
             </a:extLst>
           </p:cNvPr>
@@ -5207,8 +5207,8 @@
         </p:blipFill>
         <p:spPr>
           <a:xfrm>
-            <a:off x="230487" y="2557938"/>
-            <a:ext cx="11731028" cy="3268151"/>
+            <a:off x="0" y="2324279"/>
+            <a:ext cx="12192000" cy="3418176"/>
           </a:xfrm>
           <a:prstGeom prst="rect">
             <a:avLst/>

</xml_diff>